<commit_message>
Updated error in timetable
</commit_message>
<xml_diff>
--- a/slides/1. course mechanics.pptx
+++ b/slides/1. course mechanics.pptx
@@ -913,62 +913,7 @@
           <a:lstStyle/>
           <a:p>
             <a:pPr eaLnBrk="1" hangingPunct="1"/>
-            <a:r>
-              <a:rPr lang="en-US"/>
-              <a:t>Show video….? </a:t>
-            </a:r>
-            <a:r>
-              <a:rPr lang="en-US">
-                <a:hlinkClick r:id="rId3"/>
-              </a:rPr>
-              <a:t>http://www.youtube.com/watch?v=dGCJ46vyR9o</a:t>
-            </a:r>
-            <a:r>
-              <a:rPr lang="en-US"/>
-              <a:t>; talk about this also </a:t>
-            </a:r>
-          </a:p>
-          <a:p>
-            <a:pPr eaLnBrk="1" hangingPunct="1"/>
-            <a:r>
-              <a:rPr lang="en-US"/>
-              <a:t>Ken Robinson? </a:t>
-            </a:r>
-            <a:r>
-              <a:rPr lang="en-US">
-                <a:hlinkClick r:id="rId4"/>
-              </a:rPr>
-              <a:t>http://www.youtube.com/watch?v=iG9CE55wbtY</a:t>
-            </a:r>
-            <a:endParaRPr lang="en-US"/>
-          </a:p>
-          <a:p>
-            <a:pPr eaLnBrk="1" hangingPunct="1"/>
-            <a:r>
-              <a:rPr lang="en-US"/>
-              <a:t>Readings for next week.</a:t>
-            </a:r>
-          </a:p>
-          <a:p>
-            <a:pPr eaLnBrk="1" hangingPunct="1"/>
-            <a:r>
-              <a:rPr lang="en-US"/>
-              <a:t>Assignment #1… think about it. </a:t>
-            </a:r>
-          </a:p>
-          <a:p>
-            <a:pPr eaLnBrk="1" hangingPunct="1"/>
-            <a:r>
-              <a:rPr lang="en-US"/>
-              <a:t>Philosophy stuff</a:t>
-            </a:r>
-          </a:p>
-          <a:p>
-            <a:pPr eaLnBrk="1" hangingPunct="1"/>
-            <a:r>
-              <a:rPr lang="en-US"/>
-              <a:t>Add dates to the slides</a:t>
-            </a:r>
+            <a:endParaRPr lang="en-US" dirty="0"/>
           </a:p>
         </p:txBody>
       </p:sp>
@@ -6890,15 +6835,7 @@
             </a:pPr>
             <a:r>
               <a:rPr lang="en-US" sz="2400" dirty="0" smtClean="0"/>
-              <a:t>15:30 - </a:t>
-            </a:r>
-            <a:r>
-              <a:rPr lang="en-US" sz="2400" dirty="0" smtClean="0"/>
-              <a:t>16:</a:t>
-            </a:r>
-            <a:r>
-              <a:rPr lang="en-US" sz="2400" dirty="0" smtClean="0"/>
-              <a:t>00		</a:t>
+              <a:t>15:30 - 16:00		</a:t>
             </a:r>
             <a:r>
               <a:rPr lang="en-US" sz="2400" dirty="0" smtClean="0">
@@ -6914,12 +6851,8 @@
               <a:buNone/>
             </a:pPr>
             <a:r>
-              <a:rPr lang="en-US" sz="2400" smtClean="0"/>
-              <a:t>16:</a:t>
-            </a:r>
-            <a:r>
               <a:rPr lang="en-US" sz="2400" dirty="0" smtClean="0"/>
-              <a:t>00 - 17:00		5. Evaluation &amp; 6. Wrap-up</a:t>
+              <a:t>16:00 - 17:00		5. Evaluation &amp; 6. Wrap-up</a:t>
             </a:r>
           </a:p>
           <a:p>

</xml_diff>